<commit_message>
minor text and link updates
</commit_message>
<xml_diff>
--- a/documents/AI Consoles.pptx
+++ b/documents/AI Consoles.pptx
@@ -117,151 +117,6 @@
 </p:presentation>
 </file>
 
-<file path=ppt/revisionInfo.xml><?xml version="1.0" encoding="utf-8"?>
-<p1510:revInfo xmlns:a="http://schemas.openxmlformats.org/drawingml/2006/main" xmlns:r="http://schemas.openxmlformats.org/officeDocument/2006/relationships" xmlns:p1510="http://schemas.microsoft.com/office/powerpoint/2015/10/main">
-  <p1510:revLst>
-    <p1510:client id="{43DBE58E-9B9D-406E-B51D-573C0D4CD99A}" v="4" dt="2026-02-12T18:37:45.690"/>
-  </p1510:revLst>
-</p1510:revInfo>
-</file>
-
-<file path=ppt/changesInfos/changesInfo1.xml><?xml version="1.0" encoding="utf-8"?>
-<pc:chgInfo xmlns:a="http://schemas.openxmlformats.org/drawingml/2006/main" xmlns:r="http://schemas.openxmlformats.org/officeDocument/2006/relationships" xmlns:ac="http://schemas.microsoft.com/office/drawing/2013/main/command" xmlns:pc="http://schemas.microsoft.com/office/powerpoint/2013/main/command">
-  <pc:docChgLst>
-    <pc:chgData name="James Fawcett" userId="8e51e0eb5f6d7f4b" providerId="LiveId" clId="{48D2E37E-D3D9-42CB-B0B1-D930C960B035}"/>
-    <pc:docChg chg="custSel addSld modSld">
-      <pc:chgData name="James Fawcett" userId="8e51e0eb5f6d7f4b" providerId="LiveId" clId="{48D2E37E-D3D9-42CB-B0B1-D930C960B035}" dt="2026-02-12T18:42:23.442" v="2117" actId="255"/>
-      <pc:docMkLst>
-        <pc:docMk/>
-      </pc:docMkLst>
-      <pc:sldChg chg="modSp new mod">
-        <pc:chgData name="James Fawcett" userId="8e51e0eb5f6d7f4b" providerId="LiveId" clId="{48D2E37E-D3D9-42CB-B0B1-D930C960B035}" dt="2026-02-12T17:44:53.006" v="733" actId="20577"/>
-        <pc:sldMkLst>
-          <pc:docMk/>
-          <pc:sldMk cId="4024214594" sldId="257"/>
-        </pc:sldMkLst>
-        <pc:spChg chg="mod">
-          <ac:chgData name="James Fawcett" userId="8e51e0eb5f6d7f4b" providerId="LiveId" clId="{48D2E37E-D3D9-42CB-B0B1-D930C960B035}" dt="2026-02-12T17:14:20.067" v="11" actId="20577"/>
-          <ac:spMkLst>
-            <pc:docMk/>
-            <pc:sldMk cId="4024214594" sldId="257"/>
-            <ac:spMk id="2" creationId="{6BA957F7-9767-00E2-5FD5-E62977D5209E}"/>
-          </ac:spMkLst>
-        </pc:spChg>
-        <pc:spChg chg="mod">
-          <ac:chgData name="James Fawcett" userId="8e51e0eb5f6d7f4b" providerId="LiveId" clId="{48D2E37E-D3D9-42CB-B0B1-D930C960B035}" dt="2026-02-12T17:44:53.006" v="733" actId="20577"/>
-          <ac:spMkLst>
-            <pc:docMk/>
-            <pc:sldMk cId="4024214594" sldId="257"/>
-            <ac:spMk id="3" creationId="{13A3C5D0-C8F9-76F8-C0BA-E4F577A53867}"/>
-          </ac:spMkLst>
-        </pc:spChg>
-      </pc:sldChg>
-      <pc:sldChg chg="modSp new mod">
-        <pc:chgData name="James Fawcett" userId="8e51e0eb5f6d7f4b" providerId="LiveId" clId="{48D2E37E-D3D9-42CB-B0B1-D930C960B035}" dt="2026-02-12T17:52:23.097" v="1100" actId="120"/>
-        <pc:sldMkLst>
-          <pc:docMk/>
-          <pc:sldMk cId="3551006965" sldId="258"/>
-        </pc:sldMkLst>
-        <pc:spChg chg="mod">
-          <ac:chgData name="James Fawcett" userId="8e51e0eb5f6d7f4b" providerId="LiveId" clId="{48D2E37E-D3D9-42CB-B0B1-D930C960B035}" dt="2026-02-12T17:46:09.684" v="744" actId="20577"/>
-          <ac:spMkLst>
-            <pc:docMk/>
-            <pc:sldMk cId="3551006965" sldId="258"/>
-            <ac:spMk id="2" creationId="{A6B829D7-3DF3-6AA1-19B3-443566F196C8}"/>
-          </ac:spMkLst>
-        </pc:spChg>
-        <pc:spChg chg="mod">
-          <ac:chgData name="James Fawcett" userId="8e51e0eb5f6d7f4b" providerId="LiveId" clId="{48D2E37E-D3D9-42CB-B0B1-D930C960B035}" dt="2026-02-12T17:52:23.097" v="1100" actId="120"/>
-          <ac:spMkLst>
-            <pc:docMk/>
-            <pc:sldMk cId="3551006965" sldId="258"/>
-            <ac:spMk id="3" creationId="{7ACD46CA-510A-4E2D-E133-0BAAFAE61EAD}"/>
-          </ac:spMkLst>
-        </pc:spChg>
-      </pc:sldChg>
-      <pc:sldChg chg="modSp new mod">
-        <pc:chgData name="James Fawcett" userId="8e51e0eb5f6d7f4b" providerId="LiveId" clId="{48D2E37E-D3D9-42CB-B0B1-D930C960B035}" dt="2026-02-12T17:59:12.661" v="1509" actId="20577"/>
-        <pc:sldMkLst>
-          <pc:docMk/>
-          <pc:sldMk cId="645228135" sldId="259"/>
-        </pc:sldMkLst>
-        <pc:spChg chg="mod">
-          <ac:chgData name="James Fawcett" userId="8e51e0eb5f6d7f4b" providerId="LiveId" clId="{48D2E37E-D3D9-42CB-B0B1-D930C960B035}" dt="2026-02-12T17:54:41.697" v="1133" actId="20577"/>
-          <ac:spMkLst>
-            <pc:docMk/>
-            <pc:sldMk cId="645228135" sldId="259"/>
-            <ac:spMk id="2" creationId="{FD798348-05B7-8B60-A779-ABE4DE4BF81B}"/>
-          </ac:spMkLst>
-        </pc:spChg>
-        <pc:spChg chg="mod">
-          <ac:chgData name="James Fawcett" userId="8e51e0eb5f6d7f4b" providerId="LiveId" clId="{48D2E37E-D3D9-42CB-B0B1-D930C960B035}" dt="2026-02-12T17:59:12.661" v="1509" actId="20577"/>
-          <ac:spMkLst>
-            <pc:docMk/>
-            <pc:sldMk cId="645228135" sldId="259"/>
-            <ac:spMk id="3" creationId="{00B82AF0-79E3-688B-258C-6A6631DCC6D1}"/>
-          </ac:spMkLst>
-        </pc:spChg>
-      </pc:sldChg>
-      <pc:sldChg chg="addSp delSp modSp new mod">
-        <pc:chgData name="James Fawcett" userId="8e51e0eb5f6d7f4b" providerId="LiveId" clId="{48D2E37E-D3D9-42CB-B0B1-D930C960B035}" dt="2026-02-12T18:29:12.203" v="1553" actId="1076"/>
-        <pc:sldMkLst>
-          <pc:docMk/>
-          <pc:sldMk cId="1610534858" sldId="260"/>
-        </pc:sldMkLst>
-        <pc:spChg chg="mod">
-          <ac:chgData name="James Fawcett" userId="8e51e0eb5f6d7f4b" providerId="LiveId" clId="{48D2E37E-D3D9-42CB-B0B1-D930C960B035}" dt="2026-02-12T18:00:18.808" v="1548" actId="20577"/>
-          <ac:spMkLst>
-            <pc:docMk/>
-            <pc:sldMk cId="1610534858" sldId="260"/>
-            <ac:spMk id="2" creationId="{4F094641-2674-C10D-CA48-E51F669BE94F}"/>
-          </ac:spMkLst>
-        </pc:spChg>
-        <pc:spChg chg="del">
-          <ac:chgData name="James Fawcett" userId="8e51e0eb5f6d7f4b" providerId="LiveId" clId="{48D2E37E-D3D9-42CB-B0B1-D930C960B035}" dt="2026-02-12T18:28:40.137" v="1549" actId="22"/>
-          <ac:spMkLst>
-            <pc:docMk/>
-            <pc:sldMk cId="1610534858" sldId="260"/>
-            <ac:spMk id="3" creationId="{0AD39304-849E-AB11-D5F0-6F3E4BEF9B1B}"/>
-          </ac:spMkLst>
-        </pc:spChg>
-        <pc:picChg chg="add mod ord">
-          <ac:chgData name="James Fawcett" userId="8e51e0eb5f6d7f4b" providerId="LiveId" clId="{48D2E37E-D3D9-42CB-B0B1-D930C960B035}" dt="2026-02-12T18:29:12.203" v="1553" actId="1076"/>
-          <ac:picMkLst>
-            <pc:docMk/>
-            <pc:sldMk cId="1610534858" sldId="260"/>
-            <ac:picMk id="5" creationId="{598AC007-A191-AC57-870F-A38BACFF889A}"/>
-          </ac:picMkLst>
-        </pc:picChg>
-      </pc:sldChg>
-      <pc:sldChg chg="modSp new mod">
-        <pc:chgData name="James Fawcett" userId="8e51e0eb5f6d7f4b" providerId="LiveId" clId="{48D2E37E-D3D9-42CB-B0B1-D930C960B035}" dt="2026-02-12T18:42:23.442" v="2117" actId="255"/>
-        <pc:sldMkLst>
-          <pc:docMk/>
-          <pc:sldMk cId="1293377236" sldId="261"/>
-        </pc:sldMkLst>
-        <pc:spChg chg="mod">
-          <ac:chgData name="James Fawcett" userId="8e51e0eb5f6d7f4b" providerId="LiveId" clId="{48D2E37E-D3D9-42CB-B0B1-D930C960B035}" dt="2026-02-12T18:31:07.155" v="1564" actId="20577"/>
-          <ac:spMkLst>
-            <pc:docMk/>
-            <pc:sldMk cId="1293377236" sldId="261"/>
-            <ac:spMk id="2" creationId="{449B5359-56BA-B84F-BAE6-95C71381FB39}"/>
-          </ac:spMkLst>
-        </pc:spChg>
-        <pc:spChg chg="mod">
-          <ac:chgData name="James Fawcett" userId="8e51e0eb5f6d7f4b" providerId="LiveId" clId="{48D2E37E-D3D9-42CB-B0B1-D930C960B035}" dt="2026-02-12T18:42:23.442" v="2117" actId="255"/>
-          <ac:spMkLst>
-            <pc:docMk/>
-            <pc:sldMk cId="1293377236" sldId="261"/>
-            <ac:spMk id="3" creationId="{F90384F4-97BD-5083-7738-87926FA883D2}"/>
-          </ac:spMkLst>
-        </pc:spChg>
-      </pc:sldChg>
-    </pc:docChg>
-  </pc:docChgLst>
-</pc:chgInfo>
-</file>
-
 <file path=ppt/slideLayouts/slideLayout1.xml><?xml version="1.0" encoding="utf-8"?>
 <p:sldLayout xmlns:a="http://schemas.openxmlformats.org/drawingml/2006/main" xmlns:r="http://schemas.openxmlformats.org/officeDocument/2006/relationships" xmlns:p="http://schemas.openxmlformats.org/presentationml/2006/main" type="title" preserve="1">
   <p:cSld name="Title Slide">
@@ -409,7 +264,7 @@
           <a:p>
             <a:fld id="{9D590DE8-E47E-4901-BAAB-5A2F9286F8C9}" type="datetimeFigureOut">
               <a:rPr lang="en-US" smtClean="0"/>
-              <a:t>2/12/2026</a:t>
+              <a:t>2/13/2026</a:t>
             </a:fld>
             <a:endParaRPr lang="en-US"/>
           </a:p>
@@ -607,7 +462,7 @@
           <a:p>
             <a:fld id="{9D590DE8-E47E-4901-BAAB-5A2F9286F8C9}" type="datetimeFigureOut">
               <a:rPr lang="en-US" smtClean="0"/>
-              <a:t>2/12/2026</a:t>
+              <a:t>2/13/2026</a:t>
             </a:fld>
             <a:endParaRPr lang="en-US"/>
           </a:p>
@@ -815,7 +670,7 @@
           <a:p>
             <a:fld id="{9D590DE8-E47E-4901-BAAB-5A2F9286F8C9}" type="datetimeFigureOut">
               <a:rPr lang="en-US" smtClean="0"/>
-              <a:t>2/12/2026</a:t>
+              <a:t>2/13/2026</a:t>
             </a:fld>
             <a:endParaRPr lang="en-US"/>
           </a:p>
@@ -1013,7 +868,7 @@
           <a:p>
             <a:fld id="{9D590DE8-E47E-4901-BAAB-5A2F9286F8C9}" type="datetimeFigureOut">
               <a:rPr lang="en-US" smtClean="0"/>
-              <a:t>2/12/2026</a:t>
+              <a:t>2/13/2026</a:t>
             </a:fld>
             <a:endParaRPr lang="en-US"/>
           </a:p>
@@ -1288,7 +1143,7 @@
           <a:p>
             <a:fld id="{9D590DE8-E47E-4901-BAAB-5A2F9286F8C9}" type="datetimeFigureOut">
               <a:rPr lang="en-US" smtClean="0"/>
-              <a:t>2/12/2026</a:t>
+              <a:t>2/13/2026</a:t>
             </a:fld>
             <a:endParaRPr lang="en-US"/>
           </a:p>
@@ -1553,7 +1408,7 @@
           <a:p>
             <a:fld id="{9D590DE8-E47E-4901-BAAB-5A2F9286F8C9}" type="datetimeFigureOut">
               <a:rPr lang="en-US" smtClean="0"/>
-              <a:t>2/12/2026</a:t>
+              <a:t>2/13/2026</a:t>
             </a:fld>
             <a:endParaRPr lang="en-US"/>
           </a:p>
@@ -1965,7 +1820,7 @@
           <a:p>
             <a:fld id="{9D590DE8-E47E-4901-BAAB-5A2F9286F8C9}" type="datetimeFigureOut">
               <a:rPr lang="en-US" smtClean="0"/>
-              <a:t>2/12/2026</a:t>
+              <a:t>2/13/2026</a:t>
             </a:fld>
             <a:endParaRPr lang="en-US"/>
           </a:p>
@@ -2106,7 +1961,7 @@
           <a:p>
             <a:fld id="{9D590DE8-E47E-4901-BAAB-5A2F9286F8C9}" type="datetimeFigureOut">
               <a:rPr lang="en-US" smtClean="0"/>
-              <a:t>2/12/2026</a:t>
+              <a:t>2/13/2026</a:t>
             </a:fld>
             <a:endParaRPr lang="en-US"/>
           </a:p>
@@ -2219,7 +2074,7 @@
           <a:p>
             <a:fld id="{9D590DE8-E47E-4901-BAAB-5A2F9286F8C9}" type="datetimeFigureOut">
               <a:rPr lang="en-US" smtClean="0"/>
-              <a:t>2/12/2026</a:t>
+              <a:t>2/13/2026</a:t>
             </a:fld>
             <a:endParaRPr lang="en-US"/>
           </a:p>
@@ -2530,7 +2385,7 @@
           <a:p>
             <a:fld id="{9D590DE8-E47E-4901-BAAB-5A2F9286F8C9}" type="datetimeFigureOut">
               <a:rPr lang="en-US" smtClean="0"/>
-              <a:t>2/12/2026</a:t>
+              <a:t>2/13/2026</a:t>
             </a:fld>
             <a:endParaRPr lang="en-US"/>
           </a:p>
@@ -2818,7 +2673,7 @@
           <a:p>
             <a:fld id="{9D590DE8-E47E-4901-BAAB-5A2F9286F8C9}" type="datetimeFigureOut">
               <a:rPr lang="en-US" smtClean="0"/>
-              <a:t>2/12/2026</a:t>
+              <a:t>2/13/2026</a:t>
             </a:fld>
             <a:endParaRPr lang="en-US"/>
           </a:p>
@@ -3059,7 +2914,7 @@
           <a:p>
             <a:fld id="{9D590DE8-E47E-4901-BAAB-5A2F9286F8C9}" type="datetimeFigureOut">
               <a:rPr lang="en-US" smtClean="0"/>
-              <a:t>2/12/2026</a:t>
+              <a:t>2/13/2026</a:t>
             </a:fld>
             <a:endParaRPr lang="en-US"/>
           </a:p>
@@ -3824,7 +3679,7 @@
             <a:pPr lvl="2"/>
             <a:r>
               <a:rPr lang="en-US" dirty="0"/>
-              <a:t>Less productive than an agent for fixed tasks</a:t>
+              <a:t>Less productive than an agent for fixed repetitive tasks</a:t>
             </a:r>
           </a:p>
         </p:txBody>

</xml_diff>